<commit_message>
Added examples of probabilities in slide 10.
</commit_message>
<xml_diff>
--- a/slides/da2022-lecture-11.pptx
+++ b/slides/da2022-lecture-11.pptx
@@ -5124,6 +5124,192 @@
           </a:p>
         </p:txBody>
       </p:sp>
+      <p:sp>
+        <p:nvSpPr>
+          <p:cNvPr id="4" name="Rounded Rectangular Callout 3">
+            <a:extLst>
+              <a:ext uri="{FF2B5EF4-FFF2-40B4-BE49-F238E27FC236}">
+                <a16:creationId xmlns:a16="http://schemas.microsoft.com/office/drawing/2014/main" id="{0164C875-0B38-1B76-0E8A-87E51980EA54}"/>
+              </a:ext>
+            </a:extLst>
+          </p:cNvPr>
+          <p:cNvSpPr/>
+          <p:nvPr/>
+        </p:nvSpPr>
+        <p:spPr>
+          <a:xfrm>
+            <a:off x="8261794" y="1626024"/>
+            <a:ext cx="1968500" cy="709641"/>
+          </a:xfrm>
+          <a:prstGeom prst="wedgeRoundRectCallout">
+            <a:avLst>
+              <a:gd name="adj1" fmla="val -70629"/>
+              <a:gd name="adj2" fmla="val 12669"/>
+              <a:gd name="adj3" fmla="val 16667"/>
+            </a:avLst>
+          </a:prstGeom>
+          <a:solidFill>
+            <a:schemeClr val="accent1"/>
+          </a:solidFill>
+        </p:spPr>
+        <p:style>
+          <a:lnRef idx="2">
+            <a:schemeClr val="accent1">
+              <a:shade val="50000"/>
+            </a:schemeClr>
+          </a:lnRef>
+          <a:fillRef idx="1">
+            <a:schemeClr val="accent1"/>
+          </a:fillRef>
+          <a:effectRef idx="0">
+            <a:schemeClr val="accent1"/>
+          </a:effectRef>
+          <a:fontRef idx="minor">
+            <a:schemeClr val="lt1"/>
+          </a:fontRef>
+        </p:style>
+        <p:txBody>
+          <a:bodyPr rtlCol="0" anchor="ctr"/>
+          <a:lstStyle/>
+          <a:p>
+            <a:pPr algn="ctr">
+              <a:spcBef>
+                <a:spcPts val="2000"/>
+              </a:spcBef>
+            </a:pPr>
+            <a:r>
+              <a:rPr lang="en-US" sz="2800" dirty="0">
+                <a:latin typeface="Bernino Sans" pitchFamily="2" charset="77"/>
+              </a:rPr>
+              <a:t>e.g. 0.1%</a:t>
+            </a:r>
+          </a:p>
+        </p:txBody>
+      </p:sp>
+      <p:sp>
+        <p:nvSpPr>
+          <p:cNvPr id="5" name="Rounded Rectangular Callout 4">
+            <a:extLst>
+              <a:ext uri="{FF2B5EF4-FFF2-40B4-BE49-F238E27FC236}">
+                <a16:creationId xmlns:a16="http://schemas.microsoft.com/office/drawing/2014/main" id="{6DCE1056-E334-258A-0516-E4E4978FC497}"/>
+              </a:ext>
+            </a:extLst>
+          </p:cNvPr>
+          <p:cNvSpPr/>
+          <p:nvPr/>
+        </p:nvSpPr>
+        <p:spPr>
+          <a:xfrm>
+            <a:off x="9749971" y="2719359"/>
+            <a:ext cx="1829727" cy="709641"/>
+          </a:xfrm>
+          <a:prstGeom prst="wedgeRoundRectCallout">
+            <a:avLst>
+              <a:gd name="adj1" fmla="val -65318"/>
+              <a:gd name="adj2" fmla="val -30026"/>
+              <a:gd name="adj3" fmla="val 16667"/>
+            </a:avLst>
+          </a:prstGeom>
+          <a:solidFill>
+            <a:schemeClr val="accent1"/>
+          </a:solidFill>
+        </p:spPr>
+        <p:style>
+          <a:lnRef idx="2">
+            <a:schemeClr val="accent1">
+              <a:shade val="50000"/>
+            </a:schemeClr>
+          </a:lnRef>
+          <a:fillRef idx="1">
+            <a:schemeClr val="accent1"/>
+          </a:fillRef>
+          <a:effectRef idx="0">
+            <a:schemeClr val="accent1"/>
+          </a:effectRef>
+          <a:fontRef idx="minor">
+            <a:schemeClr val="lt1"/>
+          </a:fontRef>
+        </p:style>
+        <p:txBody>
+          <a:bodyPr rtlCol="0" anchor="ctr"/>
+          <a:lstStyle/>
+          <a:p>
+            <a:pPr algn="ctr">
+              <a:spcBef>
+                <a:spcPts val="2000"/>
+              </a:spcBef>
+            </a:pPr>
+            <a:r>
+              <a:rPr lang="en-US" sz="2800" dirty="0">
+                <a:latin typeface="Bernino Sans" pitchFamily="2" charset="77"/>
+              </a:rPr>
+              <a:t>e.g. 1%</a:t>
+            </a:r>
+          </a:p>
+        </p:txBody>
+      </p:sp>
+      <p:sp>
+        <p:nvSpPr>
+          <p:cNvPr id="6" name="Rounded Rectangular Callout 5">
+            <a:extLst>
+              <a:ext uri="{FF2B5EF4-FFF2-40B4-BE49-F238E27FC236}">
+                <a16:creationId xmlns:a16="http://schemas.microsoft.com/office/drawing/2014/main" id="{E1B676A2-4E28-2A83-56AB-F24E6FB8B739}"/>
+              </a:ext>
+            </a:extLst>
+          </p:cNvPr>
+          <p:cNvSpPr/>
+          <p:nvPr/>
+        </p:nvSpPr>
+        <p:spPr>
+          <a:xfrm>
+            <a:off x="5338073" y="4198243"/>
+            <a:ext cx="1829726" cy="709641"/>
+          </a:xfrm>
+          <a:prstGeom prst="wedgeRoundRectCallout">
+            <a:avLst>
+              <a:gd name="adj1" fmla="val -73052"/>
+              <a:gd name="adj2" fmla="val -28492"/>
+              <a:gd name="adj3" fmla="val 16667"/>
+            </a:avLst>
+          </a:prstGeom>
+          <a:solidFill>
+            <a:schemeClr val="accent1"/>
+          </a:solidFill>
+        </p:spPr>
+        <p:style>
+          <a:lnRef idx="2">
+            <a:schemeClr val="accent1">
+              <a:shade val="50000"/>
+            </a:schemeClr>
+          </a:lnRef>
+          <a:fillRef idx="1">
+            <a:schemeClr val="accent1"/>
+          </a:fillRef>
+          <a:effectRef idx="0">
+            <a:schemeClr val="accent1"/>
+          </a:effectRef>
+          <a:fontRef idx="minor">
+            <a:schemeClr val="lt1"/>
+          </a:fontRef>
+        </p:style>
+        <p:txBody>
+          <a:bodyPr rtlCol="0" anchor="ctr"/>
+          <a:lstStyle/>
+          <a:p>
+            <a:pPr algn="ctr">
+              <a:spcBef>
+                <a:spcPts val="2000"/>
+              </a:spcBef>
+            </a:pPr>
+            <a:r>
+              <a:rPr lang="en-US" sz="2800" dirty="0">
+                <a:latin typeface="Bernino Sans" pitchFamily="2" charset="77"/>
+              </a:rPr>
+              <a:t>e.g. 10%</a:t>
+            </a:r>
+          </a:p>
+        </p:txBody>
+      </p:sp>
     </p:spTree>
     <p:extLst>
       <p:ext uri="{BB962C8B-B14F-4D97-AF65-F5344CB8AC3E}">
@@ -5234,6 +5420,33 @@
                                   </p:childTnLst>
                                 </p:cTn>
                               </p:par>
+                              <p:par>
+                                <p:cTn id="11" presetID="1" presetClass="entr" presetSubtype="0" fill="hold" grpId="0" nodeType="withEffect">
+                                  <p:stCondLst>
+                                    <p:cond delay="0"/>
+                                  </p:stCondLst>
+                                  <p:childTnLst>
+                                    <p:set>
+                                      <p:cBhvr>
+                                        <p:cTn id="12" dur="1" fill="hold">
+                                          <p:stCondLst>
+                                            <p:cond delay="0"/>
+                                          </p:stCondLst>
+                                        </p:cTn>
+                                        <p:tgtEl>
+                                          <p:spTgt spid="6"/>
+                                        </p:tgtEl>
+                                        <p:attrNameLst>
+                                          <p:attrName>style.visibility</p:attrName>
+                                        </p:attrNameLst>
+                                      </p:cBhvr>
+                                      <p:to>
+                                        <p:strVal val="visible"/>
+                                      </p:to>
+                                    </p:set>
+                                  </p:childTnLst>
+                                </p:cTn>
+                              </p:par>
                             </p:childTnLst>
                           </p:cTn>
                         </p:par>
@@ -5261,6 +5474,9 @@
         </p:cTn>
       </p:par>
     </p:tnLst>
+    <p:bldLst>
+      <p:bldP spid="6" grpId="0" animBg="1"/>
+    </p:bldLst>
   </p:timing>
 </p:sld>
 </file>

</xml_diff>